<commit_message>
Latest version of report and slides
</commit_message>
<xml_diff>
--- a/SocialMovie.pptx
+++ b/SocialMovie.pptx
@@ -148,6 +148,162 @@
 <file path=ppt/changesInfos/changesInfo1.xml><?xml version="1.0" encoding="utf-8"?>
 <pc:chgInfo xmlns:a="http://schemas.openxmlformats.org/drawingml/2006/main" xmlns:r="http://schemas.openxmlformats.org/officeDocument/2006/relationships" xmlns:ac="http://schemas.microsoft.com/office/drawing/2013/main/command" xmlns:pc="http://schemas.microsoft.com/office/powerpoint/2013/main/command">
   <pc:docChgLst>
+    <pc:chgData name="Simon Flückiger" userId="31e39605-11e8-4454-8840-b6719850d345" providerId="ADAL" clId="{1EAC250D-F605-4DB9-AE8C-D3E9A3C65275}"/>
+    <pc:docChg chg="undo custSel addSld delSld modSld">
+      <pc:chgData name="Simon Flückiger" userId="31e39605-11e8-4454-8840-b6719850d345" providerId="ADAL" clId="{1EAC250D-F605-4DB9-AE8C-D3E9A3C65275}" dt="2020-01-19T23:01:28.756" v="99" actId="2696"/>
+      <pc:docMkLst>
+        <pc:docMk/>
+      </pc:docMkLst>
+      <pc:sldChg chg="modSp">
+        <pc:chgData name="Simon Flückiger" userId="31e39605-11e8-4454-8840-b6719850d345" providerId="ADAL" clId="{1EAC250D-F605-4DB9-AE8C-D3E9A3C65275}" dt="2020-01-18T15:28:15.899" v="64" actId="20577"/>
+        <pc:sldMkLst>
+          <pc:docMk/>
+          <pc:sldMk cId="3422491181" sldId="257"/>
+        </pc:sldMkLst>
+        <pc:spChg chg="mod">
+          <ac:chgData name="Simon Flückiger" userId="31e39605-11e8-4454-8840-b6719850d345" providerId="ADAL" clId="{1EAC250D-F605-4DB9-AE8C-D3E9A3C65275}" dt="2020-01-18T15:28:15.899" v="64" actId="20577"/>
+          <ac:spMkLst>
+            <pc:docMk/>
+            <pc:sldMk cId="3422491181" sldId="257"/>
+            <ac:spMk id="13" creationId="{C21DB607-71B4-46AF-814A-421760F5F018}"/>
+          </ac:spMkLst>
+        </pc:spChg>
+      </pc:sldChg>
+      <pc:sldChg chg="add del">
+        <pc:chgData name="Simon Flückiger" userId="31e39605-11e8-4454-8840-b6719850d345" providerId="ADAL" clId="{1EAC250D-F605-4DB9-AE8C-D3E9A3C65275}" dt="2020-01-19T23:01:28.756" v="99" actId="2696"/>
+        <pc:sldMkLst>
+          <pc:docMk/>
+          <pc:sldMk cId="62414889" sldId="261"/>
+        </pc:sldMkLst>
+      </pc:sldChg>
+      <pc:sldChg chg="modSp">
+        <pc:chgData name="Simon Flückiger" userId="31e39605-11e8-4454-8840-b6719850d345" providerId="ADAL" clId="{1EAC250D-F605-4DB9-AE8C-D3E9A3C65275}" dt="2020-01-18T15:27:09.399" v="10" actId="20577"/>
+        <pc:sldMkLst>
+          <pc:docMk/>
+          <pc:sldMk cId="1795976602" sldId="262"/>
+        </pc:sldMkLst>
+        <pc:spChg chg="mod">
+          <ac:chgData name="Simon Flückiger" userId="31e39605-11e8-4454-8840-b6719850d345" providerId="ADAL" clId="{1EAC250D-F605-4DB9-AE8C-D3E9A3C65275}" dt="2020-01-18T15:27:09.399" v="10" actId="20577"/>
+          <ac:spMkLst>
+            <pc:docMk/>
+            <pc:sldMk cId="1795976602" sldId="262"/>
+            <ac:spMk id="12" creationId="{19911E46-B39C-479D-9E18-8D69BF8582A1}"/>
+          </ac:spMkLst>
+        </pc:spChg>
+      </pc:sldChg>
+      <pc:sldChg chg="modSp">
+        <pc:chgData name="Simon Flückiger" userId="31e39605-11e8-4454-8840-b6719850d345" providerId="ADAL" clId="{1EAC250D-F605-4DB9-AE8C-D3E9A3C65275}" dt="2020-01-18T15:06:00.379" v="9" actId="20577"/>
+        <pc:sldMkLst>
+          <pc:docMk/>
+          <pc:sldMk cId="4193199134" sldId="273"/>
+        </pc:sldMkLst>
+        <pc:spChg chg="mod">
+          <ac:chgData name="Simon Flückiger" userId="31e39605-11e8-4454-8840-b6719850d345" providerId="ADAL" clId="{1EAC250D-F605-4DB9-AE8C-D3E9A3C65275}" dt="2020-01-18T15:05:48.225" v="3" actId="1076"/>
+          <ac:spMkLst>
+            <pc:docMk/>
+            <pc:sldMk cId="4193199134" sldId="273"/>
+            <ac:spMk id="3" creationId="{7568BEB8-656B-4EB2-BDD0-FC257674A96E}"/>
+          </ac:spMkLst>
+        </pc:spChg>
+        <pc:spChg chg="mod">
+          <ac:chgData name="Simon Flückiger" userId="31e39605-11e8-4454-8840-b6719850d345" providerId="ADAL" clId="{1EAC250D-F605-4DB9-AE8C-D3E9A3C65275}" dt="2020-01-18T15:06:00.379" v="9" actId="20577"/>
+          <ac:spMkLst>
+            <pc:docMk/>
+            <pc:sldMk cId="4193199134" sldId="273"/>
+            <ac:spMk id="12" creationId="{19911E46-B39C-479D-9E18-8D69BF8582A1}"/>
+          </ac:spMkLst>
+        </pc:spChg>
+      </pc:sldChg>
+      <pc:sldChg chg="addSp delSp modSp add del">
+        <pc:chgData name="Simon Flückiger" userId="31e39605-11e8-4454-8840-b6719850d345" providerId="ADAL" clId="{1EAC250D-F605-4DB9-AE8C-D3E9A3C65275}" dt="2020-01-19T20:44:35.110" v="97" actId="2696"/>
+        <pc:sldMkLst>
+          <pc:docMk/>
+          <pc:sldMk cId="1496774546" sldId="277"/>
+        </pc:sldMkLst>
+        <pc:spChg chg="del">
+          <ac:chgData name="Simon Flückiger" userId="31e39605-11e8-4454-8840-b6719850d345" providerId="ADAL" clId="{1EAC250D-F605-4DB9-AE8C-D3E9A3C65275}" dt="2020-01-19T20:25:15.617" v="66" actId="478"/>
+          <ac:spMkLst>
+            <pc:docMk/>
+            <pc:sldMk cId="1496774546" sldId="277"/>
+            <ac:spMk id="3" creationId="{7568BEB8-656B-4EB2-BDD0-FC257674A96E}"/>
+          </ac:spMkLst>
+        </pc:spChg>
+        <pc:spChg chg="del">
+          <ac:chgData name="Simon Flückiger" userId="31e39605-11e8-4454-8840-b6719850d345" providerId="ADAL" clId="{1EAC250D-F605-4DB9-AE8C-D3E9A3C65275}" dt="2020-01-19T20:25:16.835" v="67" actId="478"/>
+          <ac:spMkLst>
+            <pc:docMk/>
+            <pc:sldMk cId="1496774546" sldId="277"/>
+            <ac:spMk id="17" creationId="{70EDEE86-4032-477F-AD58-6FF0DED2F99D}"/>
+          </ac:spMkLst>
+        </pc:spChg>
+        <pc:spChg chg="del">
+          <ac:chgData name="Simon Flückiger" userId="31e39605-11e8-4454-8840-b6719850d345" providerId="ADAL" clId="{1EAC250D-F605-4DB9-AE8C-D3E9A3C65275}" dt="2020-01-19T20:25:17.568" v="68" actId="478"/>
+          <ac:spMkLst>
+            <pc:docMk/>
+            <pc:sldMk cId="1496774546" sldId="277"/>
+            <ac:spMk id="19" creationId="{3B62043C-E85A-495C-A10C-3B66BBFDB711}"/>
+          </ac:spMkLst>
+        </pc:spChg>
+        <pc:picChg chg="add mod">
+          <ac:chgData name="Simon Flückiger" userId="31e39605-11e8-4454-8840-b6719850d345" providerId="ADAL" clId="{1EAC250D-F605-4DB9-AE8C-D3E9A3C65275}" dt="2020-01-19T20:33:33.872" v="87" actId="1076"/>
+          <ac:picMkLst>
+            <pc:docMk/>
+            <pc:sldMk cId="1496774546" sldId="277"/>
+            <ac:picMk id="4" creationId="{BF0F322E-438B-4840-B552-FF8BEE5748C2}"/>
+          </ac:picMkLst>
+        </pc:picChg>
+        <pc:picChg chg="add del mod">
+          <ac:chgData name="Simon Flückiger" userId="31e39605-11e8-4454-8840-b6719850d345" providerId="ADAL" clId="{1EAC250D-F605-4DB9-AE8C-D3E9A3C65275}" dt="2020-01-19T20:36:13.379" v="96" actId="1076"/>
+          <ac:picMkLst>
+            <pc:docMk/>
+            <pc:sldMk cId="1496774546" sldId="277"/>
+            <ac:picMk id="6" creationId="{43CB2EC3-FB8D-4C34-92FD-C8628667B7A0}"/>
+          </ac:picMkLst>
+        </pc:picChg>
+        <pc:picChg chg="add mod">
+          <ac:chgData name="Simon Flückiger" userId="31e39605-11e8-4454-8840-b6719850d345" providerId="ADAL" clId="{1EAC250D-F605-4DB9-AE8C-D3E9A3C65275}" dt="2020-01-19T20:33:32.165" v="86" actId="1076"/>
+          <ac:picMkLst>
+            <pc:docMk/>
+            <pc:sldMk cId="1496774546" sldId="277"/>
+            <ac:picMk id="9" creationId="{D26CFF3F-E70B-4A2F-9235-88E5D3F335D0}"/>
+          </ac:picMkLst>
+        </pc:picChg>
+        <pc:picChg chg="add mod">
+          <ac:chgData name="Simon Flückiger" userId="31e39605-11e8-4454-8840-b6719850d345" providerId="ADAL" clId="{1EAC250D-F605-4DB9-AE8C-D3E9A3C65275}" dt="2020-01-19T20:33:19.977" v="79" actId="1076"/>
+          <ac:picMkLst>
+            <pc:docMk/>
+            <pc:sldMk cId="1496774546" sldId="277"/>
+            <ac:picMk id="13" creationId="{C1698330-28B6-4AE3-8366-45FD1671565E}"/>
+          </ac:picMkLst>
+        </pc:picChg>
+        <pc:picChg chg="add del mod">
+          <ac:chgData name="Simon Flückiger" userId="31e39605-11e8-4454-8840-b6719850d345" providerId="ADAL" clId="{1EAC250D-F605-4DB9-AE8C-D3E9A3C65275}" dt="2020-01-19T20:35:13.494" v="94"/>
+          <ac:picMkLst>
+            <pc:docMk/>
+            <pc:sldMk cId="1496774546" sldId="277"/>
+            <ac:picMk id="1026" creationId="{4E1B5039-C97A-484B-B4B7-97BCAA26FA31}"/>
+          </ac:picMkLst>
+        </pc:picChg>
+      </pc:sldChg>
+    </pc:docChg>
+  </pc:docChgLst>
+  <pc:docChgLst>
+    <pc:chgData name="Frédéric Korradi" userId="9ed6f12c-2786-4d39-b099-d9c2e0c27260" providerId="ADAL" clId="{4A0A53F0-BEF4-4EB7-88BE-447435B3230E}"/>
+    <pc:docChg chg="addSld modSld">
+      <pc:chgData name="Frédéric Korradi" userId="9ed6f12c-2786-4d39-b099-d9c2e0c27260" providerId="ADAL" clId="{4A0A53F0-BEF4-4EB7-88BE-447435B3230E}" dt="2020-01-19T14:51:34.425" v="0"/>
+      <pc:docMkLst>
+        <pc:docMk/>
+      </pc:docMkLst>
+      <pc:sldChg chg="add">
+        <pc:chgData name="Frédéric Korradi" userId="9ed6f12c-2786-4d39-b099-d9c2e0c27260" providerId="ADAL" clId="{4A0A53F0-BEF4-4EB7-88BE-447435B3230E}" dt="2020-01-19T14:51:34.425" v="0"/>
+        <pc:sldMkLst>
+          <pc:docMk/>
+          <pc:sldMk cId="2911652642" sldId="276"/>
+        </pc:sldMkLst>
+      </pc:sldChg>
+    </pc:docChg>
+  </pc:docChgLst>
+  <pc:docChgLst>
     <pc:chgData name="Frédéric Korradi" userId="9ed6f12c-2786-4d39-b099-d9c2e0c27260" providerId="ADAL" clId="{87E593C3-9003-4F58-A3DD-A69D3DBB8BB3}"/>
     <pc:docChg chg="undo redo custSel mod addSld delSld modSld sldOrd">
       <pc:chgData name="Frédéric Korradi" userId="9ed6f12c-2786-4d39-b099-d9c2e0c27260" providerId="ADAL" clId="{87E593C3-9003-4F58-A3DD-A69D3DBB8BB3}" dt="2020-01-19T23:43:00.779" v="2054" actId="20577"/>
@@ -2944,162 +3100,6 @@
       </pc:sldChg>
     </pc:docChg>
   </pc:docChgLst>
-  <pc:docChgLst>
-    <pc:chgData name="Frédéric Korradi" userId="9ed6f12c-2786-4d39-b099-d9c2e0c27260" providerId="ADAL" clId="{4A0A53F0-BEF4-4EB7-88BE-447435B3230E}"/>
-    <pc:docChg chg="addSld modSld">
-      <pc:chgData name="Frédéric Korradi" userId="9ed6f12c-2786-4d39-b099-d9c2e0c27260" providerId="ADAL" clId="{4A0A53F0-BEF4-4EB7-88BE-447435B3230E}" dt="2020-01-19T14:51:34.425" v="0"/>
-      <pc:docMkLst>
-        <pc:docMk/>
-      </pc:docMkLst>
-      <pc:sldChg chg="add">
-        <pc:chgData name="Frédéric Korradi" userId="9ed6f12c-2786-4d39-b099-d9c2e0c27260" providerId="ADAL" clId="{4A0A53F0-BEF4-4EB7-88BE-447435B3230E}" dt="2020-01-19T14:51:34.425" v="0"/>
-        <pc:sldMkLst>
-          <pc:docMk/>
-          <pc:sldMk cId="2911652642" sldId="276"/>
-        </pc:sldMkLst>
-      </pc:sldChg>
-    </pc:docChg>
-  </pc:docChgLst>
-  <pc:docChgLst>
-    <pc:chgData name="Simon Flückiger" userId="31e39605-11e8-4454-8840-b6719850d345" providerId="ADAL" clId="{1EAC250D-F605-4DB9-AE8C-D3E9A3C65275}"/>
-    <pc:docChg chg="undo custSel addSld delSld modSld">
-      <pc:chgData name="Simon Flückiger" userId="31e39605-11e8-4454-8840-b6719850d345" providerId="ADAL" clId="{1EAC250D-F605-4DB9-AE8C-D3E9A3C65275}" dt="2020-01-19T23:01:28.756" v="99" actId="2696"/>
-      <pc:docMkLst>
-        <pc:docMk/>
-      </pc:docMkLst>
-      <pc:sldChg chg="modSp">
-        <pc:chgData name="Simon Flückiger" userId="31e39605-11e8-4454-8840-b6719850d345" providerId="ADAL" clId="{1EAC250D-F605-4DB9-AE8C-D3E9A3C65275}" dt="2020-01-18T15:28:15.899" v="64" actId="20577"/>
-        <pc:sldMkLst>
-          <pc:docMk/>
-          <pc:sldMk cId="3422491181" sldId="257"/>
-        </pc:sldMkLst>
-        <pc:spChg chg="mod">
-          <ac:chgData name="Simon Flückiger" userId="31e39605-11e8-4454-8840-b6719850d345" providerId="ADAL" clId="{1EAC250D-F605-4DB9-AE8C-D3E9A3C65275}" dt="2020-01-18T15:28:15.899" v="64" actId="20577"/>
-          <ac:spMkLst>
-            <pc:docMk/>
-            <pc:sldMk cId="3422491181" sldId="257"/>
-            <ac:spMk id="13" creationId="{C21DB607-71B4-46AF-814A-421760F5F018}"/>
-          </ac:spMkLst>
-        </pc:spChg>
-      </pc:sldChg>
-      <pc:sldChg chg="add del">
-        <pc:chgData name="Simon Flückiger" userId="31e39605-11e8-4454-8840-b6719850d345" providerId="ADAL" clId="{1EAC250D-F605-4DB9-AE8C-D3E9A3C65275}" dt="2020-01-19T23:01:28.756" v="99" actId="2696"/>
-        <pc:sldMkLst>
-          <pc:docMk/>
-          <pc:sldMk cId="62414889" sldId="261"/>
-        </pc:sldMkLst>
-      </pc:sldChg>
-      <pc:sldChg chg="modSp">
-        <pc:chgData name="Simon Flückiger" userId="31e39605-11e8-4454-8840-b6719850d345" providerId="ADAL" clId="{1EAC250D-F605-4DB9-AE8C-D3E9A3C65275}" dt="2020-01-18T15:27:09.399" v="10" actId="20577"/>
-        <pc:sldMkLst>
-          <pc:docMk/>
-          <pc:sldMk cId="1795976602" sldId="262"/>
-        </pc:sldMkLst>
-        <pc:spChg chg="mod">
-          <ac:chgData name="Simon Flückiger" userId="31e39605-11e8-4454-8840-b6719850d345" providerId="ADAL" clId="{1EAC250D-F605-4DB9-AE8C-D3E9A3C65275}" dt="2020-01-18T15:27:09.399" v="10" actId="20577"/>
-          <ac:spMkLst>
-            <pc:docMk/>
-            <pc:sldMk cId="1795976602" sldId="262"/>
-            <ac:spMk id="12" creationId="{19911E46-B39C-479D-9E18-8D69BF8582A1}"/>
-          </ac:spMkLst>
-        </pc:spChg>
-      </pc:sldChg>
-      <pc:sldChg chg="modSp">
-        <pc:chgData name="Simon Flückiger" userId="31e39605-11e8-4454-8840-b6719850d345" providerId="ADAL" clId="{1EAC250D-F605-4DB9-AE8C-D3E9A3C65275}" dt="2020-01-18T15:06:00.379" v="9" actId="20577"/>
-        <pc:sldMkLst>
-          <pc:docMk/>
-          <pc:sldMk cId="4193199134" sldId="273"/>
-        </pc:sldMkLst>
-        <pc:spChg chg="mod">
-          <ac:chgData name="Simon Flückiger" userId="31e39605-11e8-4454-8840-b6719850d345" providerId="ADAL" clId="{1EAC250D-F605-4DB9-AE8C-D3E9A3C65275}" dt="2020-01-18T15:05:48.225" v="3" actId="1076"/>
-          <ac:spMkLst>
-            <pc:docMk/>
-            <pc:sldMk cId="4193199134" sldId="273"/>
-            <ac:spMk id="3" creationId="{7568BEB8-656B-4EB2-BDD0-FC257674A96E}"/>
-          </ac:spMkLst>
-        </pc:spChg>
-        <pc:spChg chg="mod">
-          <ac:chgData name="Simon Flückiger" userId="31e39605-11e8-4454-8840-b6719850d345" providerId="ADAL" clId="{1EAC250D-F605-4DB9-AE8C-D3E9A3C65275}" dt="2020-01-18T15:06:00.379" v="9" actId="20577"/>
-          <ac:spMkLst>
-            <pc:docMk/>
-            <pc:sldMk cId="4193199134" sldId="273"/>
-            <ac:spMk id="12" creationId="{19911E46-B39C-479D-9E18-8D69BF8582A1}"/>
-          </ac:spMkLst>
-        </pc:spChg>
-      </pc:sldChg>
-      <pc:sldChg chg="addSp delSp modSp add del">
-        <pc:chgData name="Simon Flückiger" userId="31e39605-11e8-4454-8840-b6719850d345" providerId="ADAL" clId="{1EAC250D-F605-4DB9-AE8C-D3E9A3C65275}" dt="2020-01-19T20:44:35.110" v="97" actId="2696"/>
-        <pc:sldMkLst>
-          <pc:docMk/>
-          <pc:sldMk cId="1496774546" sldId="277"/>
-        </pc:sldMkLst>
-        <pc:spChg chg="del">
-          <ac:chgData name="Simon Flückiger" userId="31e39605-11e8-4454-8840-b6719850d345" providerId="ADAL" clId="{1EAC250D-F605-4DB9-AE8C-D3E9A3C65275}" dt="2020-01-19T20:25:15.617" v="66" actId="478"/>
-          <ac:spMkLst>
-            <pc:docMk/>
-            <pc:sldMk cId="1496774546" sldId="277"/>
-            <ac:spMk id="3" creationId="{7568BEB8-656B-4EB2-BDD0-FC257674A96E}"/>
-          </ac:spMkLst>
-        </pc:spChg>
-        <pc:spChg chg="del">
-          <ac:chgData name="Simon Flückiger" userId="31e39605-11e8-4454-8840-b6719850d345" providerId="ADAL" clId="{1EAC250D-F605-4DB9-AE8C-D3E9A3C65275}" dt="2020-01-19T20:25:16.835" v="67" actId="478"/>
-          <ac:spMkLst>
-            <pc:docMk/>
-            <pc:sldMk cId="1496774546" sldId="277"/>
-            <ac:spMk id="17" creationId="{70EDEE86-4032-477F-AD58-6FF0DED2F99D}"/>
-          </ac:spMkLst>
-        </pc:spChg>
-        <pc:spChg chg="del">
-          <ac:chgData name="Simon Flückiger" userId="31e39605-11e8-4454-8840-b6719850d345" providerId="ADAL" clId="{1EAC250D-F605-4DB9-AE8C-D3E9A3C65275}" dt="2020-01-19T20:25:17.568" v="68" actId="478"/>
-          <ac:spMkLst>
-            <pc:docMk/>
-            <pc:sldMk cId="1496774546" sldId="277"/>
-            <ac:spMk id="19" creationId="{3B62043C-E85A-495C-A10C-3B66BBFDB711}"/>
-          </ac:spMkLst>
-        </pc:spChg>
-        <pc:picChg chg="add mod">
-          <ac:chgData name="Simon Flückiger" userId="31e39605-11e8-4454-8840-b6719850d345" providerId="ADAL" clId="{1EAC250D-F605-4DB9-AE8C-D3E9A3C65275}" dt="2020-01-19T20:33:33.872" v="87" actId="1076"/>
-          <ac:picMkLst>
-            <pc:docMk/>
-            <pc:sldMk cId="1496774546" sldId="277"/>
-            <ac:picMk id="4" creationId="{BF0F322E-438B-4840-B552-FF8BEE5748C2}"/>
-          </ac:picMkLst>
-        </pc:picChg>
-        <pc:picChg chg="add del mod">
-          <ac:chgData name="Simon Flückiger" userId="31e39605-11e8-4454-8840-b6719850d345" providerId="ADAL" clId="{1EAC250D-F605-4DB9-AE8C-D3E9A3C65275}" dt="2020-01-19T20:36:13.379" v="96" actId="1076"/>
-          <ac:picMkLst>
-            <pc:docMk/>
-            <pc:sldMk cId="1496774546" sldId="277"/>
-            <ac:picMk id="6" creationId="{43CB2EC3-FB8D-4C34-92FD-C8628667B7A0}"/>
-          </ac:picMkLst>
-        </pc:picChg>
-        <pc:picChg chg="add mod">
-          <ac:chgData name="Simon Flückiger" userId="31e39605-11e8-4454-8840-b6719850d345" providerId="ADAL" clId="{1EAC250D-F605-4DB9-AE8C-D3E9A3C65275}" dt="2020-01-19T20:33:32.165" v="86" actId="1076"/>
-          <ac:picMkLst>
-            <pc:docMk/>
-            <pc:sldMk cId="1496774546" sldId="277"/>
-            <ac:picMk id="9" creationId="{D26CFF3F-E70B-4A2F-9235-88E5D3F335D0}"/>
-          </ac:picMkLst>
-        </pc:picChg>
-        <pc:picChg chg="add mod">
-          <ac:chgData name="Simon Flückiger" userId="31e39605-11e8-4454-8840-b6719850d345" providerId="ADAL" clId="{1EAC250D-F605-4DB9-AE8C-D3E9A3C65275}" dt="2020-01-19T20:33:19.977" v="79" actId="1076"/>
-          <ac:picMkLst>
-            <pc:docMk/>
-            <pc:sldMk cId="1496774546" sldId="277"/>
-            <ac:picMk id="13" creationId="{C1698330-28B6-4AE3-8366-45FD1671565E}"/>
-          </ac:picMkLst>
-        </pc:picChg>
-        <pc:picChg chg="add del mod">
-          <ac:chgData name="Simon Flückiger" userId="31e39605-11e8-4454-8840-b6719850d345" providerId="ADAL" clId="{1EAC250D-F605-4DB9-AE8C-D3E9A3C65275}" dt="2020-01-19T20:35:13.494" v="94"/>
-          <ac:picMkLst>
-            <pc:docMk/>
-            <pc:sldMk cId="1496774546" sldId="277"/>
-            <ac:picMk id="1026" creationId="{4E1B5039-C97A-484B-B4B7-97BCAA26FA31}"/>
-          </ac:picMkLst>
-        </pc:picChg>
-      </pc:sldChg>
-    </pc:docChg>
-  </pc:docChgLst>
 </pc:chgInfo>
 </file>
 
@@ -3252,7 +3252,7 @@
           <a:p>
             <a:fld id="{C10E83D4-157F-49D2-B85F-C4CD607402FA}" type="datetimeFigureOut">
               <a:rPr lang="en-CH" smtClean="0"/>
-              <a:t>20/01/2020</a:t>
+              <a:t>01/20/2020</a:t>
             </a:fld>
             <a:endParaRPr lang="en-CH"/>
           </a:p>
@@ -3452,7 +3452,7 @@
           <a:p>
             <a:fld id="{C10E83D4-157F-49D2-B85F-C4CD607402FA}" type="datetimeFigureOut">
               <a:rPr lang="en-CH" smtClean="0"/>
-              <a:t>20/01/2020</a:t>
+              <a:t>01/20/2020</a:t>
             </a:fld>
             <a:endParaRPr lang="en-CH"/>
           </a:p>
@@ -3662,7 +3662,7 @@
           <a:p>
             <a:fld id="{C10E83D4-157F-49D2-B85F-C4CD607402FA}" type="datetimeFigureOut">
               <a:rPr lang="en-CH" smtClean="0"/>
-              <a:t>20/01/2020</a:t>
+              <a:t>01/20/2020</a:t>
             </a:fld>
             <a:endParaRPr lang="en-CH"/>
           </a:p>
@@ -3862,7 +3862,7 @@
           <a:p>
             <a:fld id="{C10E83D4-157F-49D2-B85F-C4CD607402FA}" type="datetimeFigureOut">
               <a:rPr lang="en-CH" smtClean="0"/>
-              <a:t>20/01/2020</a:t>
+              <a:t>01/20/2020</a:t>
             </a:fld>
             <a:endParaRPr lang="en-CH"/>
           </a:p>
@@ -4138,7 +4138,7 @@
           <a:p>
             <a:fld id="{C10E83D4-157F-49D2-B85F-C4CD607402FA}" type="datetimeFigureOut">
               <a:rPr lang="en-CH" smtClean="0"/>
-              <a:t>20/01/2020</a:t>
+              <a:t>01/20/2020</a:t>
             </a:fld>
             <a:endParaRPr lang="en-CH"/>
           </a:p>
@@ -4406,7 +4406,7 @@
           <a:p>
             <a:fld id="{C10E83D4-157F-49D2-B85F-C4CD607402FA}" type="datetimeFigureOut">
               <a:rPr lang="en-CH" smtClean="0"/>
-              <a:t>20/01/2020</a:t>
+              <a:t>01/20/2020</a:t>
             </a:fld>
             <a:endParaRPr lang="en-CH"/>
           </a:p>
@@ -4821,7 +4821,7 @@
           <a:p>
             <a:fld id="{C10E83D4-157F-49D2-B85F-C4CD607402FA}" type="datetimeFigureOut">
               <a:rPr lang="en-CH" smtClean="0"/>
-              <a:t>20/01/2020</a:t>
+              <a:t>01/20/2020</a:t>
             </a:fld>
             <a:endParaRPr lang="en-CH"/>
           </a:p>
@@ -4963,7 +4963,7 @@
           <a:p>
             <a:fld id="{C10E83D4-157F-49D2-B85F-C4CD607402FA}" type="datetimeFigureOut">
               <a:rPr lang="en-CH" smtClean="0"/>
-              <a:t>20/01/2020</a:t>
+              <a:t>01/20/2020</a:t>
             </a:fld>
             <a:endParaRPr lang="en-CH"/>
           </a:p>
@@ -5076,7 +5076,7 @@
           <a:p>
             <a:fld id="{C10E83D4-157F-49D2-B85F-C4CD607402FA}" type="datetimeFigureOut">
               <a:rPr lang="en-CH" smtClean="0"/>
-              <a:t>20/01/2020</a:t>
+              <a:t>01/20/2020</a:t>
             </a:fld>
             <a:endParaRPr lang="en-CH"/>
           </a:p>
@@ -5389,7 +5389,7 @@
           <a:p>
             <a:fld id="{C10E83D4-157F-49D2-B85F-C4CD607402FA}" type="datetimeFigureOut">
               <a:rPr lang="en-CH" smtClean="0"/>
-              <a:t>20/01/2020</a:t>
+              <a:t>01/20/2020</a:t>
             </a:fld>
             <a:endParaRPr lang="en-CH"/>
           </a:p>
@@ -5678,7 +5678,7 @@
           <a:p>
             <a:fld id="{C10E83D4-157F-49D2-B85F-C4CD607402FA}" type="datetimeFigureOut">
               <a:rPr lang="en-CH" smtClean="0"/>
-              <a:t>20/01/2020</a:t>
+              <a:t>01/20/2020</a:t>
             </a:fld>
             <a:endParaRPr lang="en-CH"/>
           </a:p>
@@ -5921,7 +5921,7 @@
           <a:p>
             <a:fld id="{C10E83D4-157F-49D2-B85F-C4CD607402FA}" type="datetimeFigureOut">
               <a:rPr lang="en-CH" smtClean="0"/>
-              <a:t>20/01/2020</a:t>
+              <a:t>01/20/2020</a:t>
             </a:fld>
             <a:endParaRPr lang="en-CH"/>
           </a:p>
@@ -11514,8 +11514,8 @@
           </a:p>
         </p:txBody>
       </p:sp>
-      <mc:AlternateContent xmlns:mc="http://schemas.openxmlformats.org/markup-compatibility/2006">
-        <mc:Choice xmlns:a14="http://schemas.microsoft.com/office/drawing/2010/main" Requires="a14">
+      <mc:AlternateContent xmlns:mc="http://schemas.openxmlformats.org/markup-compatibility/2006" xmlns:a14="http://schemas.microsoft.com/office/drawing/2010/main">
+        <mc:Choice Requires="a14">
           <p:sp>
             <p:nvSpPr>
               <p:cNvPr id="130" name="Rectangle 129">
@@ -11727,7 +11727,7 @@
             </p:txBody>
           </p:sp>
         </mc:Choice>
-        <mc:Fallback>
+        <mc:Fallback xmlns="">
           <p:sp>
             <p:nvSpPr>
               <p:cNvPr id="130" name="Rectangle 129">
@@ -11832,13 +11832,13 @@
   <p:clrMapOvr>
     <a:masterClrMapping/>
   </p:clrMapOvr>
-  <mc:AlternateContent xmlns:mc="http://schemas.openxmlformats.org/markup-compatibility/2006">
-    <mc:Choice xmlns:p159="http://schemas.microsoft.com/office/powerpoint/2015/09/main" Requires="p159">
+  <mc:AlternateContent xmlns:mc="http://schemas.openxmlformats.org/markup-compatibility/2006" xmlns:p159="http://schemas.microsoft.com/office/powerpoint/2015/09/main">
+    <mc:Choice Requires="p159">
       <p:transition spd="slow">
         <p159:morph option="byChar"/>
       </p:transition>
     </mc:Choice>
-    <mc:Fallback>
+    <mc:Fallback xmlns="">
       <p:transition spd="slow">
         <p:fade/>
       </p:transition>
@@ -14060,8 +14060,8 @@
             </p:nvSpPr>
             <p:spPr>
               <a:xfrm>
-                <a:off x="8471966" y="5415025"/>
-                <a:ext cx="3601063" cy="1341649"/>
+                <a:off x="5552277" y="5987189"/>
+                <a:ext cx="6603474" cy="837922"/>
               </a:xfrm>
               <a:prstGeom prst="rect">
                 <a:avLst/>
@@ -14085,21 +14085,21 @@
                     </m:oMathParaPr>
                     <m:oMath xmlns:m="http://schemas.openxmlformats.org/officeDocument/2006/math">
                       <m:r>
-                        <a:rPr lang="en-CH" sz="2800" i="1">
+                        <a:rPr lang="en-US" b="0" i="1" smtClean="0">
                           <a:latin typeface="Cambria Math" panose="02040503050406030204" pitchFamily="18" charset="0"/>
                         </a:rPr>
                         <m:t>𝑠</m:t>
                       </m:r>
                       <m:r>
-                        <a:rPr lang="en-CH" sz="2800">
+                        <a:rPr lang="de-CH" i="1">
                           <a:latin typeface="Cambria Math" panose="02040503050406030204" pitchFamily="18" charset="0"/>
                         </a:rPr>
-                        <m:t>=</m:t>
+                        <m:t>= </m:t>
                       </m:r>
                       <m:f>
                         <m:fPr>
                           <m:ctrlPr>
-                            <a:rPr lang="en-CH" sz="2800" i="1">
+                            <a:rPr lang="fr-CH" i="1">
                               <a:latin typeface="Cambria Math" panose="02040503050406030204" pitchFamily="18" charset="0"/>
                             </a:rPr>
                           </m:ctrlPr>
@@ -14108,151 +14108,336 @@
                           <m:nary>
                             <m:naryPr>
                               <m:chr m:val="∑"/>
-                              <m:limLoc m:val="subSup"/>
-                              <m:grow m:val="on"/>
+                              <m:limLoc m:val="undOvr"/>
                               <m:ctrlPr>
-                                <a:rPr lang="en-CH" sz="2800" i="1">
+                                <a:rPr lang="fr-CH" i="1">
                                   <a:latin typeface="Cambria Math" panose="02040503050406030204" pitchFamily="18" charset="0"/>
                                 </a:rPr>
                               </m:ctrlPr>
                             </m:naryPr>
                             <m:sub>
                               <m:r>
-                                <a:rPr lang="en-CH" sz="2800" i="1">
+                                <a:rPr lang="fr-CH" i="1">
                                   <a:latin typeface="Cambria Math" panose="02040503050406030204" pitchFamily="18" charset="0"/>
                                 </a:rPr>
                                 <m:t>𝑘</m:t>
                               </m:r>
                               <m:r>
-                                <a:rPr lang="en-CH" sz="2800">
+                                <a:rPr lang="de-CH" i="1">
                                   <a:latin typeface="Cambria Math" panose="02040503050406030204" pitchFamily="18" charset="0"/>
                                 </a:rPr>
-                                <m:t>=1   </m:t>
+                                <m:t>=0</m:t>
                               </m:r>
                             </m:sub>
                             <m:sup>
                               <m:r>
-                                <a:rPr lang="en-CH" sz="2800" i="1">
+                                <a:rPr lang="fr-CH" i="1">
                                   <a:latin typeface="Cambria Math" panose="02040503050406030204" pitchFamily="18" charset="0"/>
                                 </a:rPr>
-                                <m:t>𝑛</m:t>
+                                <m:t>𝑑𝑒𝑝𝑡</m:t>
+                              </m:r>
+                              <m:r>
+                                <a:rPr lang="de-CH" i="1">
+                                  <a:latin typeface="Cambria Math" panose="02040503050406030204" pitchFamily="18" charset="0"/>
+                                </a:rPr>
+                                <m:t>h</m:t>
                               </m:r>
                             </m:sup>
                             <m:e>
-                              <m:sSub>
-                                <m:sSubPr>
+                              <m:sSup>
+                                <m:sSupPr>
                                   <m:ctrlPr>
-                                    <a:rPr lang="en-CH" sz="2800" i="1">
+                                    <a:rPr lang="fr-CH" i="1">
                                       <a:latin typeface="Cambria Math" panose="02040503050406030204" pitchFamily="18" charset="0"/>
                                     </a:rPr>
                                   </m:ctrlPr>
-                                </m:sSubPr>
+                                </m:sSupPr>
                                 <m:e>
-                                  <m:f>
-                                    <m:fPr>
-                                      <m:ctrlPr>
-                                        <a:rPr lang="en-CH" sz="2800" i="1">
-                                          <a:latin typeface="Cambria Math" panose="02040503050406030204" pitchFamily="18" charset="0"/>
-                                        </a:rPr>
-                                      </m:ctrlPr>
-                                    </m:fPr>
-                                    <m:num>
-                                      <m:r>
-                                        <a:rPr lang="en-CH" sz="2800">
-                                          <a:latin typeface="Cambria Math" panose="02040503050406030204" pitchFamily="18" charset="0"/>
-                                        </a:rPr>
-                                        <m:t>1</m:t>
-                                      </m:r>
-                                    </m:num>
-                                    <m:den>
-                                      <m:sSup>
-                                        <m:sSupPr>
-                                          <m:ctrlPr>
-                                            <a:rPr lang="en-CH" sz="2800" i="1">
-                                              <a:latin typeface="Cambria Math" panose="02040503050406030204" pitchFamily="18" charset="0"/>
-                                            </a:rPr>
-                                          </m:ctrlPr>
-                                        </m:sSupPr>
-                                        <m:e>
-                                          <m:r>
-                                            <a:rPr lang="en-CH" sz="2800">
-                                              <a:latin typeface="Cambria Math" panose="02040503050406030204" pitchFamily="18" charset="0"/>
-                                            </a:rPr>
-                                            <m:t>2</m:t>
-                                          </m:r>
-                                        </m:e>
-                                        <m:sup>
-                                          <m:d>
-                                            <m:dPr>
-                                              <m:ctrlPr>
-                                                <a:rPr lang="en-CH" sz="2800" i="1">
-                                                  <a:latin typeface="Cambria Math" panose="02040503050406030204" pitchFamily="18" charset="0"/>
-                                                </a:rPr>
-                                              </m:ctrlPr>
-                                            </m:dPr>
-                                            <m:e>
-                                              <m:r>
-                                                <a:rPr lang="en-CH" sz="2800" i="1">
-                                                  <a:latin typeface="Cambria Math" panose="02040503050406030204" pitchFamily="18" charset="0"/>
-                                                </a:rPr>
-                                                <m:t>𝑖</m:t>
-                                              </m:r>
-                                              <m:r>
-                                                <a:rPr lang="en-CH" sz="2800">
-                                                  <a:latin typeface="Cambria Math" panose="02040503050406030204" pitchFamily="18" charset="0"/>
-                                                </a:rPr>
-                                                <m:t>−1</m:t>
-                                              </m:r>
-                                            </m:e>
-                                          </m:d>
-                                        </m:sup>
-                                      </m:sSup>
-                                    </m:den>
-                                  </m:f>
                                   <m:r>
-                                    <a:rPr lang="en-CH" sz="2800">
+                                    <a:rPr lang="de-CH" i="1">
                                       <a:latin typeface="Cambria Math" panose="02040503050406030204" pitchFamily="18" charset="0"/>
                                     </a:rPr>
-                                    <m:t> </m:t>
+                                    <m:t>2</m:t>
+                                  </m:r>
+                                </m:e>
+                                <m:sup>
+                                  <m:r>
+                                    <a:rPr lang="fr-CH" i="1">
+                                      <a:latin typeface="Cambria Math" panose="02040503050406030204" pitchFamily="18" charset="0"/>
+                                    </a:rPr>
+                                    <m:t>𝑑𝑒𝑝𝑡</m:t>
                                   </m:r>
                                   <m:r>
-                                    <a:rPr lang="en-CH" sz="2800" i="1">
+                                    <a:rPr lang="de-CH" i="1">
                                       <a:latin typeface="Cambria Math" panose="02040503050406030204" pitchFamily="18" charset="0"/>
                                     </a:rPr>
-                                    <m:t>𝑥</m:t>
+                                    <m:t>h</m:t>
                                   </m:r>
-                                </m:e>
-                                <m:sub>
                                   <m:r>
-                                    <a:rPr lang="en-CH" sz="2800" i="1">
+                                    <a:rPr lang="de-CH" i="1">
+                                      <a:latin typeface="Cambria Math" panose="02040503050406030204" pitchFamily="18" charset="0"/>
+                                    </a:rPr>
+                                    <m:t>−</m:t>
+                                  </m:r>
+                                  <m:r>
+                                    <a:rPr lang="fr-CH" i="1">
                                       <a:latin typeface="Cambria Math" panose="02040503050406030204" pitchFamily="18" charset="0"/>
                                     </a:rPr>
                                     <m:t>𝑘</m:t>
                                   </m:r>
-                                </m:sub>
-                              </m:sSub>
+                                </m:sup>
+                              </m:sSup>
                               <m:r>
-                                <a:rPr lang="en-CH" sz="2800">
+                                <a:rPr lang="de-CH" i="1">
+                                  <a:latin typeface="Cambria Math" panose="02040503050406030204" pitchFamily="18" charset="0"/>
+                                </a:rPr>
+                                <m:t>∙</m:t>
+                              </m:r>
+                              <m:acc>
+                                <m:accPr>
+                                  <m:chr m:val="̅"/>
+                                  <m:ctrlPr>
+                                    <a:rPr lang="fr-CH" i="1">
+                                      <a:latin typeface="Cambria Math" panose="02040503050406030204" pitchFamily="18" charset="0"/>
+                                    </a:rPr>
+                                  </m:ctrlPr>
+                                </m:accPr>
+                                <m:e>
+                                  <m:sSub>
+                                    <m:sSubPr>
+                                      <m:ctrlPr>
+                                        <a:rPr lang="fr-CH" i="1">
+                                          <a:latin typeface="Cambria Math" panose="02040503050406030204" pitchFamily="18" charset="0"/>
+                                        </a:rPr>
+                                      </m:ctrlPr>
+                                    </m:sSubPr>
+                                    <m:e>
+                                      <m:r>
+                                        <a:rPr lang="fr-CH" i="1">
+                                          <a:latin typeface="Cambria Math" panose="02040503050406030204" pitchFamily="18" charset="0"/>
+                                        </a:rPr>
+                                        <m:t>𝑥</m:t>
+                                      </m:r>
+                                    </m:e>
+                                    <m:sub>
+                                      <m:r>
+                                        <a:rPr lang="fr-CH" i="1">
+                                          <a:latin typeface="Cambria Math" panose="02040503050406030204" pitchFamily="18" charset="0"/>
+                                        </a:rPr>
+                                        <m:t>𝑘</m:t>
+                                      </m:r>
+                                    </m:sub>
+                                  </m:sSub>
+                                </m:e>
+                              </m:acc>
+                            </m:e>
+                          </m:nary>
+                        </m:num>
+                        <m:den>
+                          <m:nary>
+                            <m:naryPr>
+                              <m:chr m:val="∑"/>
+                              <m:limLoc m:val="undOvr"/>
+                              <m:ctrlPr>
+                                <a:rPr lang="fr-CH" i="1">
+                                  <a:latin typeface="Cambria Math" panose="02040503050406030204" pitchFamily="18" charset="0"/>
+                                </a:rPr>
+                              </m:ctrlPr>
+                            </m:naryPr>
+                            <m:sub>
+                              <m:r>
+                                <a:rPr lang="fr-CH" i="1">
+                                  <a:latin typeface="Cambria Math" panose="02040503050406030204" pitchFamily="18" charset="0"/>
+                                </a:rPr>
+                                <m:t>𝑘</m:t>
+                              </m:r>
+                              <m:r>
+                                <a:rPr lang="de-CH" i="1">
+                                  <a:latin typeface="Cambria Math" panose="02040503050406030204" pitchFamily="18" charset="0"/>
+                                </a:rPr>
+                                <m:t>=0</m:t>
+                              </m:r>
+                            </m:sub>
+                            <m:sup>
+                              <m:r>
+                                <a:rPr lang="fr-CH" i="1">
+                                  <a:latin typeface="Cambria Math" panose="02040503050406030204" pitchFamily="18" charset="0"/>
+                                </a:rPr>
+                                <m:t>𝑑𝑒𝑝𝑡</m:t>
+                              </m:r>
+                              <m:r>
+                                <a:rPr lang="de-CH" i="1">
+                                  <a:latin typeface="Cambria Math" panose="02040503050406030204" pitchFamily="18" charset="0"/>
+                                </a:rPr>
+                                <m:t>h</m:t>
+                              </m:r>
+                            </m:sup>
+                            <m:e>
+                              <m:sSup>
+                                <m:sSupPr>
+                                  <m:ctrlPr>
+                                    <a:rPr lang="fr-CH" i="1">
+                                      <a:latin typeface="Cambria Math" panose="02040503050406030204" pitchFamily="18" charset="0"/>
+                                    </a:rPr>
+                                  </m:ctrlPr>
+                                </m:sSupPr>
+                                <m:e>
+                                  <m:r>
+                                    <a:rPr lang="de-CH" i="1">
+                                      <a:latin typeface="Cambria Math" panose="02040503050406030204" pitchFamily="18" charset="0"/>
+                                    </a:rPr>
+                                    <m:t>2</m:t>
+                                  </m:r>
+                                </m:e>
+                                <m:sup>
+                                  <m:r>
+                                    <a:rPr lang="fr-CH" i="1">
+                                      <a:latin typeface="Cambria Math" panose="02040503050406030204" pitchFamily="18" charset="0"/>
+                                    </a:rPr>
+                                    <m:t>𝑑𝑒𝑝𝑡</m:t>
+                                  </m:r>
+                                  <m:r>
+                                    <a:rPr lang="de-CH" i="1">
+                                      <a:latin typeface="Cambria Math" panose="02040503050406030204" pitchFamily="18" charset="0"/>
+                                    </a:rPr>
+                                    <m:t>h</m:t>
+                                  </m:r>
+                                  <m:r>
+                                    <a:rPr lang="de-CH" i="1">
+                                      <a:latin typeface="Cambria Math" panose="02040503050406030204" pitchFamily="18" charset="0"/>
+                                    </a:rPr>
+                                    <m:t>−</m:t>
+                                  </m:r>
+                                  <m:r>
+                                    <a:rPr lang="fr-CH" i="1">
+                                      <a:latin typeface="Cambria Math" panose="02040503050406030204" pitchFamily="18" charset="0"/>
+                                    </a:rPr>
+                                    <m:t>𝑘</m:t>
+                                  </m:r>
+                                </m:sup>
+                              </m:sSup>
+                              <m:r>
+                                <a:rPr lang="de-CH" i="1">
+                                  <a:latin typeface="Cambria Math" panose="02040503050406030204" pitchFamily="18" charset="0"/>
+                                </a:rPr>
+                                <m:t>∙{1 </m:t>
+                              </m:r>
+                              <m:r>
+                                <a:rPr lang="fr-CH" i="1">
+                                  <a:latin typeface="Cambria Math" panose="02040503050406030204" pitchFamily="18" charset="0"/>
+                                </a:rPr>
+                                <m:t>𝑠𝑖</m:t>
+                              </m:r>
+                              <m:r>
+                                <a:rPr lang="fr-CH" i="1">
                                   <a:latin typeface="Cambria Math" panose="02040503050406030204" pitchFamily="18" charset="0"/>
                                 </a:rPr>
                                 <m:t> </m:t>
                               </m:r>
+                              <m:r>
+                                <a:rPr lang="fr-CH" i="1">
+                                  <a:latin typeface="Cambria Math" panose="02040503050406030204" pitchFamily="18" charset="0"/>
+                                </a:rPr>
+                                <m:t>𝑎𝑢</m:t>
+                              </m:r>
+                              <m:r>
+                                <a:rPr lang="fr-CH" i="1">
+                                  <a:latin typeface="Cambria Math" panose="02040503050406030204" pitchFamily="18" charset="0"/>
+                                </a:rPr>
+                                <m:t> </m:t>
+                              </m:r>
+                              <m:r>
+                                <a:rPr lang="fr-CH" i="1">
+                                  <a:latin typeface="Cambria Math" panose="02040503050406030204" pitchFamily="18" charset="0"/>
+                                </a:rPr>
+                                <m:t>𝑚𝑜𝑖𝑛𝑠</m:t>
+                              </m:r>
+                              <m:r>
+                                <a:rPr lang="fr-CH" i="1">
+                                  <a:latin typeface="Cambria Math" panose="02040503050406030204" pitchFamily="18" charset="0"/>
+                                </a:rPr>
+                                <m:t> </m:t>
+                              </m:r>
+                              <m:r>
+                                <a:rPr lang="fr-CH" i="1">
+                                  <a:latin typeface="Cambria Math" panose="02040503050406030204" pitchFamily="18" charset="0"/>
+                                </a:rPr>
+                                <m:t>𝑢𝑛𝑒</m:t>
+                              </m:r>
+                              <m:r>
+                                <a:rPr lang="fr-CH" i="1">
+                                  <a:latin typeface="Cambria Math" panose="02040503050406030204" pitchFamily="18" charset="0"/>
+                                </a:rPr>
+                                <m:t> </m:t>
+                              </m:r>
+                              <m:r>
+                                <a:rPr lang="fr-CH" i="1">
+                                  <a:latin typeface="Cambria Math" panose="02040503050406030204" pitchFamily="18" charset="0"/>
+                                </a:rPr>
+                                <m:t>𝑛𝑜𝑡𝑒</m:t>
+                              </m:r>
+                              <m:r>
+                                <a:rPr lang="fr-CH" i="1">
+                                  <a:latin typeface="Cambria Math" panose="02040503050406030204" pitchFamily="18" charset="0"/>
+                                </a:rPr>
+                                <m:t> </m:t>
+                              </m:r>
+                              <m:r>
+                                <a:rPr lang="fr-CH" i="1">
+                                  <a:latin typeface="Cambria Math" panose="02040503050406030204" pitchFamily="18" charset="0"/>
+                                </a:rPr>
+                                <m:t>𝑎𝑢</m:t>
+                              </m:r>
+                              <m:r>
+                                <a:rPr lang="fr-CH" i="1">
+                                  <a:latin typeface="Cambria Math" panose="02040503050406030204" pitchFamily="18" charset="0"/>
+                                </a:rPr>
+                                <m:t> </m:t>
+                              </m:r>
+                              <m:r>
+                                <a:rPr lang="fr-CH" i="1">
+                                  <a:latin typeface="Cambria Math" panose="02040503050406030204" pitchFamily="18" charset="0"/>
+                                </a:rPr>
+                                <m:t>𝑛𝑣</m:t>
+                              </m:r>
+                              <m:r>
+                                <a:rPr lang="fr-CH" i="1">
+                                  <a:latin typeface="Cambria Math" panose="02040503050406030204" pitchFamily="18" charset="0"/>
+                                </a:rPr>
+                                <m:t> </m:t>
+                              </m:r>
+                              <m:r>
+                                <a:rPr lang="fr-CH" i="1">
+                                  <a:latin typeface="Cambria Math" panose="02040503050406030204" pitchFamily="18" charset="0"/>
+                                </a:rPr>
+                                <m:t>𝑘</m:t>
+                              </m:r>
+                              <m:r>
+                                <a:rPr lang="de-CH" i="1">
+                                  <a:latin typeface="Cambria Math" panose="02040503050406030204" pitchFamily="18" charset="0"/>
+                                </a:rPr>
+                                <m:t>, 0 </m:t>
+                              </m:r>
+                              <m:r>
+                                <a:rPr lang="fr-CH" i="1">
+                                  <a:latin typeface="Cambria Math" panose="02040503050406030204" pitchFamily="18" charset="0"/>
+                                </a:rPr>
+                                <m:t>𝑠𝑖𝑛𝑜𝑛</m:t>
+                              </m:r>
+                              <m:r>
+                                <a:rPr lang="de-CH" i="1">
+                                  <a:latin typeface="Cambria Math" panose="02040503050406030204" pitchFamily="18" charset="0"/>
+                                </a:rPr>
+                                <m:t>}</m:t>
+                              </m:r>
                             </m:e>
                           </m:nary>
-                        </m:num>
-                        <m:den>
-                          <m:r>
-                            <a:rPr lang="en-CH" sz="2800" i="1">
-                              <a:latin typeface="Cambria Math" panose="02040503050406030204" pitchFamily="18" charset="0"/>
-                            </a:rPr>
-                            <m:t>𝑛</m:t>
-                          </m:r>
                         </m:den>
                       </m:f>
                     </m:oMath>
                   </m:oMathPara>
                 </a14:m>
-                <a:endParaRPr lang="en-CH" sz="2800"/>
+                <a:endParaRPr lang="en-CH" sz="2800" dirty="0"/>
               </a:p>
             </p:txBody>
           </p:sp>
@@ -14274,8 +14459,8 @@
             </p:nvSpPr>
             <p:spPr>
               <a:xfrm>
-                <a:off x="8471966" y="5415025"/>
-                <a:ext cx="3601063" cy="1341649"/>
+                <a:off x="5552277" y="5987189"/>
+                <a:ext cx="6603474" cy="837922"/>
               </a:xfrm>
               <a:prstGeom prst="rect">
                 <a:avLst/>
@@ -14292,7 +14477,7 @@
               <a:lstStyle/>
               <a:p>
                 <a:r>
-                  <a:rPr lang="en-CH">
+                  <a:rPr lang="LID4096">
                     <a:noFill/>
                   </a:rPr>
                   <a:t> </a:t>
@@ -14312,13 +14497,13 @@
   <p:clrMapOvr>
     <a:masterClrMapping/>
   </p:clrMapOvr>
-  <mc:AlternateContent xmlns:mc="http://schemas.openxmlformats.org/markup-compatibility/2006">
-    <mc:Choice xmlns:p159="http://schemas.microsoft.com/office/powerpoint/2015/09/main" Requires="p159">
+  <mc:AlternateContent xmlns:mc="http://schemas.openxmlformats.org/markup-compatibility/2006" xmlns:p159="http://schemas.microsoft.com/office/powerpoint/2015/09/main">
+    <mc:Choice Requires="p159">
       <p:transition spd="slow">
         <p159:morph option="byChar"/>
       </p:transition>
     </mc:Choice>
-    <mc:Fallback>
+    <mc:Fallback xmlns="">
       <p:transition spd="slow">
         <p:fade/>
       </p:transition>
@@ -16436,10 +16621,10 @@
         <mc:Choice xmlns:a14="http://schemas.microsoft.com/office/drawing/2010/main" Requires="a14">
           <p:sp>
             <p:nvSpPr>
-              <p:cNvPr id="130" name="Rectangle 129">
+              <p:cNvPr id="50" name="Rectangle 49">
                 <a:extLst>
                   <a:ext uri="{FF2B5EF4-FFF2-40B4-BE49-F238E27FC236}">
-                    <a16:creationId xmlns:a16="http://schemas.microsoft.com/office/drawing/2014/main" id="{AC9602DB-F1F0-4BE0-830C-3243705DAECF}"/>
+                    <a16:creationId xmlns:a16="http://schemas.microsoft.com/office/drawing/2014/main" id="{84F91A35-D8B5-4D29-A068-2F41D5F0311F}"/>
                   </a:ext>
                 </a:extLst>
               </p:cNvPr>
@@ -16448,8 +16633,8 @@
             </p:nvSpPr>
             <p:spPr>
               <a:xfrm>
-                <a:off x="8471966" y="5415025"/>
-                <a:ext cx="3601063" cy="1341649"/>
+                <a:off x="5552277" y="5987189"/>
+                <a:ext cx="6603474" cy="837922"/>
               </a:xfrm>
               <a:prstGeom prst="rect">
                 <a:avLst/>
@@ -16473,21 +16658,21 @@
                     </m:oMathParaPr>
                     <m:oMath xmlns:m="http://schemas.openxmlformats.org/officeDocument/2006/math">
                       <m:r>
-                        <a:rPr lang="en-CH" sz="2800" i="1">
+                        <a:rPr lang="en-US" b="0" i="1" smtClean="0">
                           <a:latin typeface="Cambria Math" panose="02040503050406030204" pitchFamily="18" charset="0"/>
                         </a:rPr>
                         <m:t>𝑠</m:t>
                       </m:r>
                       <m:r>
-                        <a:rPr lang="en-CH" sz="2800">
+                        <a:rPr lang="de-CH" i="1">
                           <a:latin typeface="Cambria Math" panose="02040503050406030204" pitchFamily="18" charset="0"/>
                         </a:rPr>
-                        <m:t>=</m:t>
+                        <m:t>= </m:t>
                       </m:r>
                       <m:f>
                         <m:fPr>
                           <m:ctrlPr>
-                            <a:rPr lang="en-CH" sz="2800" i="1">
+                            <a:rPr lang="fr-CH" i="1">
                               <a:latin typeface="Cambria Math" panose="02040503050406030204" pitchFamily="18" charset="0"/>
                             </a:rPr>
                           </m:ctrlPr>
@@ -16496,151 +16681,336 @@
                           <m:nary>
                             <m:naryPr>
                               <m:chr m:val="∑"/>
-                              <m:limLoc m:val="subSup"/>
-                              <m:grow m:val="on"/>
+                              <m:limLoc m:val="undOvr"/>
                               <m:ctrlPr>
-                                <a:rPr lang="en-CH" sz="2800" i="1">
+                                <a:rPr lang="fr-CH" i="1">
                                   <a:latin typeface="Cambria Math" panose="02040503050406030204" pitchFamily="18" charset="0"/>
                                 </a:rPr>
                               </m:ctrlPr>
                             </m:naryPr>
                             <m:sub>
                               <m:r>
-                                <a:rPr lang="en-CH" sz="2800" i="1">
+                                <a:rPr lang="fr-CH" i="1">
                                   <a:latin typeface="Cambria Math" panose="02040503050406030204" pitchFamily="18" charset="0"/>
                                 </a:rPr>
                                 <m:t>𝑘</m:t>
                               </m:r>
                               <m:r>
-                                <a:rPr lang="en-CH" sz="2800">
+                                <a:rPr lang="de-CH" i="1">
                                   <a:latin typeface="Cambria Math" panose="02040503050406030204" pitchFamily="18" charset="0"/>
                                 </a:rPr>
-                                <m:t>=1   </m:t>
+                                <m:t>=0</m:t>
                               </m:r>
                             </m:sub>
                             <m:sup>
                               <m:r>
-                                <a:rPr lang="en-CH" sz="2800" i="1">
+                                <a:rPr lang="fr-CH" i="1">
                                   <a:latin typeface="Cambria Math" panose="02040503050406030204" pitchFamily="18" charset="0"/>
                                 </a:rPr>
-                                <m:t>𝑛</m:t>
+                                <m:t>𝑑𝑒𝑝𝑡</m:t>
+                              </m:r>
+                              <m:r>
+                                <a:rPr lang="de-CH" i="1">
+                                  <a:latin typeface="Cambria Math" panose="02040503050406030204" pitchFamily="18" charset="0"/>
+                                </a:rPr>
+                                <m:t>h</m:t>
                               </m:r>
                             </m:sup>
                             <m:e>
-                              <m:sSub>
-                                <m:sSubPr>
+                              <m:sSup>
+                                <m:sSupPr>
                                   <m:ctrlPr>
-                                    <a:rPr lang="en-CH" sz="2800" i="1">
+                                    <a:rPr lang="fr-CH" i="1">
                                       <a:latin typeface="Cambria Math" panose="02040503050406030204" pitchFamily="18" charset="0"/>
                                     </a:rPr>
                                   </m:ctrlPr>
-                                </m:sSubPr>
+                                </m:sSupPr>
                                 <m:e>
-                                  <m:f>
-                                    <m:fPr>
-                                      <m:ctrlPr>
-                                        <a:rPr lang="en-CH" sz="2800" i="1">
-                                          <a:latin typeface="Cambria Math" panose="02040503050406030204" pitchFamily="18" charset="0"/>
-                                        </a:rPr>
-                                      </m:ctrlPr>
-                                    </m:fPr>
-                                    <m:num>
-                                      <m:r>
-                                        <a:rPr lang="en-CH" sz="2800">
-                                          <a:latin typeface="Cambria Math" panose="02040503050406030204" pitchFamily="18" charset="0"/>
-                                        </a:rPr>
-                                        <m:t>1</m:t>
-                                      </m:r>
-                                    </m:num>
-                                    <m:den>
-                                      <m:sSup>
-                                        <m:sSupPr>
-                                          <m:ctrlPr>
-                                            <a:rPr lang="en-CH" sz="2800" i="1">
-                                              <a:latin typeface="Cambria Math" panose="02040503050406030204" pitchFamily="18" charset="0"/>
-                                            </a:rPr>
-                                          </m:ctrlPr>
-                                        </m:sSupPr>
-                                        <m:e>
-                                          <m:r>
-                                            <a:rPr lang="en-CH" sz="2800">
-                                              <a:latin typeface="Cambria Math" panose="02040503050406030204" pitchFamily="18" charset="0"/>
-                                            </a:rPr>
-                                            <m:t>2</m:t>
-                                          </m:r>
-                                        </m:e>
-                                        <m:sup>
-                                          <m:d>
-                                            <m:dPr>
-                                              <m:ctrlPr>
-                                                <a:rPr lang="en-CH" sz="2800" i="1">
-                                                  <a:latin typeface="Cambria Math" panose="02040503050406030204" pitchFamily="18" charset="0"/>
-                                                </a:rPr>
-                                              </m:ctrlPr>
-                                            </m:dPr>
-                                            <m:e>
-                                              <m:r>
-                                                <a:rPr lang="en-CH" sz="2800" i="1">
-                                                  <a:latin typeface="Cambria Math" panose="02040503050406030204" pitchFamily="18" charset="0"/>
-                                                </a:rPr>
-                                                <m:t>𝑖</m:t>
-                                              </m:r>
-                                              <m:r>
-                                                <a:rPr lang="en-CH" sz="2800">
-                                                  <a:latin typeface="Cambria Math" panose="02040503050406030204" pitchFamily="18" charset="0"/>
-                                                </a:rPr>
-                                                <m:t>−1</m:t>
-                                              </m:r>
-                                            </m:e>
-                                          </m:d>
-                                        </m:sup>
-                                      </m:sSup>
-                                    </m:den>
-                                  </m:f>
                                   <m:r>
-                                    <a:rPr lang="en-CH" sz="2800">
+                                    <a:rPr lang="de-CH" i="1">
                                       <a:latin typeface="Cambria Math" panose="02040503050406030204" pitchFamily="18" charset="0"/>
                                     </a:rPr>
-                                    <m:t> </m:t>
+                                    <m:t>2</m:t>
+                                  </m:r>
+                                </m:e>
+                                <m:sup>
+                                  <m:r>
+                                    <a:rPr lang="fr-CH" i="1">
+                                      <a:latin typeface="Cambria Math" panose="02040503050406030204" pitchFamily="18" charset="0"/>
+                                    </a:rPr>
+                                    <m:t>𝑑𝑒𝑝𝑡</m:t>
                                   </m:r>
                                   <m:r>
-                                    <a:rPr lang="en-CH" sz="2800" i="1">
+                                    <a:rPr lang="de-CH" i="1">
                                       <a:latin typeface="Cambria Math" panose="02040503050406030204" pitchFamily="18" charset="0"/>
                                     </a:rPr>
-                                    <m:t>𝑥</m:t>
+                                    <m:t>h</m:t>
                                   </m:r>
-                                </m:e>
-                                <m:sub>
                                   <m:r>
-                                    <a:rPr lang="en-CH" sz="2800" i="1">
+                                    <a:rPr lang="de-CH" i="1">
+                                      <a:latin typeface="Cambria Math" panose="02040503050406030204" pitchFamily="18" charset="0"/>
+                                    </a:rPr>
+                                    <m:t>−</m:t>
+                                  </m:r>
+                                  <m:r>
+                                    <a:rPr lang="fr-CH" i="1">
                                       <a:latin typeface="Cambria Math" panose="02040503050406030204" pitchFamily="18" charset="0"/>
                                     </a:rPr>
                                     <m:t>𝑘</m:t>
                                   </m:r>
-                                </m:sub>
-                              </m:sSub>
+                                </m:sup>
+                              </m:sSup>
                               <m:r>
-                                <a:rPr lang="en-CH" sz="2800">
+                                <a:rPr lang="de-CH" i="1">
+                                  <a:latin typeface="Cambria Math" panose="02040503050406030204" pitchFamily="18" charset="0"/>
+                                </a:rPr>
+                                <m:t>∙</m:t>
+                              </m:r>
+                              <m:acc>
+                                <m:accPr>
+                                  <m:chr m:val="̅"/>
+                                  <m:ctrlPr>
+                                    <a:rPr lang="fr-CH" i="1">
+                                      <a:latin typeface="Cambria Math" panose="02040503050406030204" pitchFamily="18" charset="0"/>
+                                    </a:rPr>
+                                  </m:ctrlPr>
+                                </m:accPr>
+                                <m:e>
+                                  <m:sSub>
+                                    <m:sSubPr>
+                                      <m:ctrlPr>
+                                        <a:rPr lang="fr-CH" i="1">
+                                          <a:latin typeface="Cambria Math" panose="02040503050406030204" pitchFamily="18" charset="0"/>
+                                        </a:rPr>
+                                      </m:ctrlPr>
+                                    </m:sSubPr>
+                                    <m:e>
+                                      <m:r>
+                                        <a:rPr lang="fr-CH" i="1">
+                                          <a:latin typeface="Cambria Math" panose="02040503050406030204" pitchFamily="18" charset="0"/>
+                                        </a:rPr>
+                                        <m:t>𝑥</m:t>
+                                      </m:r>
+                                    </m:e>
+                                    <m:sub>
+                                      <m:r>
+                                        <a:rPr lang="fr-CH" i="1">
+                                          <a:latin typeface="Cambria Math" panose="02040503050406030204" pitchFamily="18" charset="0"/>
+                                        </a:rPr>
+                                        <m:t>𝑘</m:t>
+                                      </m:r>
+                                    </m:sub>
+                                  </m:sSub>
+                                </m:e>
+                              </m:acc>
+                            </m:e>
+                          </m:nary>
+                        </m:num>
+                        <m:den>
+                          <m:nary>
+                            <m:naryPr>
+                              <m:chr m:val="∑"/>
+                              <m:limLoc m:val="undOvr"/>
+                              <m:ctrlPr>
+                                <a:rPr lang="fr-CH" i="1">
+                                  <a:latin typeface="Cambria Math" panose="02040503050406030204" pitchFamily="18" charset="0"/>
+                                </a:rPr>
+                              </m:ctrlPr>
+                            </m:naryPr>
+                            <m:sub>
+                              <m:r>
+                                <a:rPr lang="fr-CH" i="1">
+                                  <a:latin typeface="Cambria Math" panose="02040503050406030204" pitchFamily="18" charset="0"/>
+                                </a:rPr>
+                                <m:t>𝑘</m:t>
+                              </m:r>
+                              <m:r>
+                                <a:rPr lang="de-CH" i="1">
+                                  <a:latin typeface="Cambria Math" panose="02040503050406030204" pitchFamily="18" charset="0"/>
+                                </a:rPr>
+                                <m:t>=0</m:t>
+                              </m:r>
+                            </m:sub>
+                            <m:sup>
+                              <m:r>
+                                <a:rPr lang="fr-CH" i="1">
+                                  <a:latin typeface="Cambria Math" panose="02040503050406030204" pitchFamily="18" charset="0"/>
+                                </a:rPr>
+                                <m:t>𝑑𝑒𝑝𝑡</m:t>
+                              </m:r>
+                              <m:r>
+                                <a:rPr lang="de-CH" i="1">
+                                  <a:latin typeface="Cambria Math" panose="02040503050406030204" pitchFamily="18" charset="0"/>
+                                </a:rPr>
+                                <m:t>h</m:t>
+                              </m:r>
+                            </m:sup>
+                            <m:e>
+                              <m:sSup>
+                                <m:sSupPr>
+                                  <m:ctrlPr>
+                                    <a:rPr lang="fr-CH" i="1">
+                                      <a:latin typeface="Cambria Math" panose="02040503050406030204" pitchFamily="18" charset="0"/>
+                                    </a:rPr>
+                                  </m:ctrlPr>
+                                </m:sSupPr>
+                                <m:e>
+                                  <m:r>
+                                    <a:rPr lang="de-CH" i="1">
+                                      <a:latin typeface="Cambria Math" panose="02040503050406030204" pitchFamily="18" charset="0"/>
+                                    </a:rPr>
+                                    <m:t>2</m:t>
+                                  </m:r>
+                                </m:e>
+                                <m:sup>
+                                  <m:r>
+                                    <a:rPr lang="fr-CH" i="1">
+                                      <a:latin typeface="Cambria Math" panose="02040503050406030204" pitchFamily="18" charset="0"/>
+                                    </a:rPr>
+                                    <m:t>𝑑𝑒𝑝𝑡</m:t>
+                                  </m:r>
+                                  <m:r>
+                                    <a:rPr lang="de-CH" i="1">
+                                      <a:latin typeface="Cambria Math" panose="02040503050406030204" pitchFamily="18" charset="0"/>
+                                    </a:rPr>
+                                    <m:t>h</m:t>
+                                  </m:r>
+                                  <m:r>
+                                    <a:rPr lang="de-CH" i="1">
+                                      <a:latin typeface="Cambria Math" panose="02040503050406030204" pitchFamily="18" charset="0"/>
+                                    </a:rPr>
+                                    <m:t>−</m:t>
+                                  </m:r>
+                                  <m:r>
+                                    <a:rPr lang="fr-CH" i="1">
+                                      <a:latin typeface="Cambria Math" panose="02040503050406030204" pitchFamily="18" charset="0"/>
+                                    </a:rPr>
+                                    <m:t>𝑘</m:t>
+                                  </m:r>
+                                </m:sup>
+                              </m:sSup>
+                              <m:r>
+                                <a:rPr lang="de-CH" i="1">
+                                  <a:latin typeface="Cambria Math" panose="02040503050406030204" pitchFamily="18" charset="0"/>
+                                </a:rPr>
+                                <m:t>∙{1 </m:t>
+                              </m:r>
+                              <m:r>
+                                <a:rPr lang="fr-CH" i="1">
+                                  <a:latin typeface="Cambria Math" panose="02040503050406030204" pitchFamily="18" charset="0"/>
+                                </a:rPr>
+                                <m:t>𝑠𝑖</m:t>
+                              </m:r>
+                              <m:r>
+                                <a:rPr lang="fr-CH" i="1">
                                   <a:latin typeface="Cambria Math" panose="02040503050406030204" pitchFamily="18" charset="0"/>
                                 </a:rPr>
                                 <m:t> </m:t>
                               </m:r>
+                              <m:r>
+                                <a:rPr lang="fr-CH" i="1">
+                                  <a:latin typeface="Cambria Math" panose="02040503050406030204" pitchFamily="18" charset="0"/>
+                                </a:rPr>
+                                <m:t>𝑎𝑢</m:t>
+                              </m:r>
+                              <m:r>
+                                <a:rPr lang="fr-CH" i="1">
+                                  <a:latin typeface="Cambria Math" panose="02040503050406030204" pitchFamily="18" charset="0"/>
+                                </a:rPr>
+                                <m:t> </m:t>
+                              </m:r>
+                              <m:r>
+                                <a:rPr lang="fr-CH" i="1">
+                                  <a:latin typeface="Cambria Math" panose="02040503050406030204" pitchFamily="18" charset="0"/>
+                                </a:rPr>
+                                <m:t>𝑚𝑜𝑖𝑛𝑠</m:t>
+                              </m:r>
+                              <m:r>
+                                <a:rPr lang="fr-CH" i="1">
+                                  <a:latin typeface="Cambria Math" panose="02040503050406030204" pitchFamily="18" charset="0"/>
+                                </a:rPr>
+                                <m:t> </m:t>
+                              </m:r>
+                              <m:r>
+                                <a:rPr lang="fr-CH" i="1">
+                                  <a:latin typeface="Cambria Math" panose="02040503050406030204" pitchFamily="18" charset="0"/>
+                                </a:rPr>
+                                <m:t>𝑢𝑛𝑒</m:t>
+                              </m:r>
+                              <m:r>
+                                <a:rPr lang="fr-CH" i="1">
+                                  <a:latin typeface="Cambria Math" panose="02040503050406030204" pitchFamily="18" charset="0"/>
+                                </a:rPr>
+                                <m:t> </m:t>
+                              </m:r>
+                              <m:r>
+                                <a:rPr lang="fr-CH" i="1">
+                                  <a:latin typeface="Cambria Math" panose="02040503050406030204" pitchFamily="18" charset="0"/>
+                                </a:rPr>
+                                <m:t>𝑛𝑜𝑡𝑒</m:t>
+                              </m:r>
+                              <m:r>
+                                <a:rPr lang="fr-CH" i="1">
+                                  <a:latin typeface="Cambria Math" panose="02040503050406030204" pitchFamily="18" charset="0"/>
+                                </a:rPr>
+                                <m:t> </m:t>
+                              </m:r>
+                              <m:r>
+                                <a:rPr lang="fr-CH" i="1">
+                                  <a:latin typeface="Cambria Math" panose="02040503050406030204" pitchFamily="18" charset="0"/>
+                                </a:rPr>
+                                <m:t>𝑎𝑢</m:t>
+                              </m:r>
+                              <m:r>
+                                <a:rPr lang="fr-CH" i="1">
+                                  <a:latin typeface="Cambria Math" panose="02040503050406030204" pitchFamily="18" charset="0"/>
+                                </a:rPr>
+                                <m:t> </m:t>
+                              </m:r>
+                              <m:r>
+                                <a:rPr lang="fr-CH" i="1">
+                                  <a:latin typeface="Cambria Math" panose="02040503050406030204" pitchFamily="18" charset="0"/>
+                                </a:rPr>
+                                <m:t>𝑛𝑣</m:t>
+                              </m:r>
+                              <m:r>
+                                <a:rPr lang="fr-CH" i="1">
+                                  <a:latin typeface="Cambria Math" panose="02040503050406030204" pitchFamily="18" charset="0"/>
+                                </a:rPr>
+                                <m:t> </m:t>
+                              </m:r>
+                              <m:r>
+                                <a:rPr lang="fr-CH" i="1">
+                                  <a:latin typeface="Cambria Math" panose="02040503050406030204" pitchFamily="18" charset="0"/>
+                                </a:rPr>
+                                <m:t>𝑘</m:t>
+                              </m:r>
+                              <m:r>
+                                <a:rPr lang="de-CH" i="1">
+                                  <a:latin typeface="Cambria Math" panose="02040503050406030204" pitchFamily="18" charset="0"/>
+                                </a:rPr>
+                                <m:t>, 0 </m:t>
+                              </m:r>
+                              <m:r>
+                                <a:rPr lang="fr-CH" i="1">
+                                  <a:latin typeface="Cambria Math" panose="02040503050406030204" pitchFamily="18" charset="0"/>
+                                </a:rPr>
+                                <m:t>𝑠𝑖𝑛𝑜𝑛</m:t>
+                              </m:r>
+                              <m:r>
+                                <a:rPr lang="de-CH" i="1">
+                                  <a:latin typeface="Cambria Math" panose="02040503050406030204" pitchFamily="18" charset="0"/>
+                                </a:rPr>
+                                <m:t>}</m:t>
+                              </m:r>
                             </m:e>
                           </m:nary>
-                        </m:num>
-                        <m:den>
-                          <m:r>
-                            <a:rPr lang="en-CH" sz="2800" i="1">
-                              <a:latin typeface="Cambria Math" panose="02040503050406030204" pitchFamily="18" charset="0"/>
-                            </a:rPr>
-                            <m:t>𝑛</m:t>
-                          </m:r>
                         </m:den>
                       </m:f>
                     </m:oMath>
                   </m:oMathPara>
                 </a14:m>
-                <a:endParaRPr lang="en-CH" sz="2800"/>
+                <a:endParaRPr lang="en-CH" sz="2800" dirty="0"/>
               </a:p>
             </p:txBody>
           </p:sp>
@@ -16648,10 +17018,10 @@
         <mc:Fallback>
           <p:sp>
             <p:nvSpPr>
-              <p:cNvPr id="130" name="Rectangle 129">
+              <p:cNvPr id="50" name="Rectangle 49">
                 <a:extLst>
                   <a:ext uri="{FF2B5EF4-FFF2-40B4-BE49-F238E27FC236}">
-                    <a16:creationId xmlns:a16="http://schemas.microsoft.com/office/drawing/2014/main" id="{AC9602DB-F1F0-4BE0-830C-3243705DAECF}"/>
+                    <a16:creationId xmlns:a16="http://schemas.microsoft.com/office/drawing/2014/main" id="{84F91A35-D8B5-4D29-A068-2F41D5F0311F}"/>
                   </a:ext>
                 </a:extLst>
               </p:cNvPr>
@@ -16662,8 +17032,8 @@
             </p:nvSpPr>
             <p:spPr>
               <a:xfrm>
-                <a:off x="8471966" y="5415025"/>
-                <a:ext cx="3601063" cy="1341649"/>
+                <a:off x="5552277" y="5987189"/>
+                <a:ext cx="6603474" cy="837922"/>
               </a:xfrm>
               <a:prstGeom prst="rect">
                 <a:avLst/>
@@ -16680,7 +17050,7 @@
               <a:lstStyle/>
               <a:p>
                 <a:r>
-                  <a:rPr lang="en-CH">
+                  <a:rPr lang="LID4096">
                     <a:noFill/>
                   </a:rPr>
                   <a:t> </a:t>
@@ -16700,13 +17070,13 @@
   <p:clrMapOvr>
     <a:masterClrMapping/>
   </p:clrMapOvr>
-  <mc:AlternateContent xmlns:mc="http://schemas.openxmlformats.org/markup-compatibility/2006">
-    <mc:Choice xmlns:p159="http://schemas.microsoft.com/office/powerpoint/2015/09/main" Requires="p159">
+  <mc:AlternateContent xmlns:mc="http://schemas.openxmlformats.org/markup-compatibility/2006" xmlns:p159="http://schemas.microsoft.com/office/powerpoint/2015/09/main">
+    <mc:Choice Requires="p159">
       <p:transition spd="slow">
         <p159:morph option="byChar"/>
       </p:transition>
     </mc:Choice>
-    <mc:Fallback>
+    <mc:Fallback xmlns="">
       <p:transition spd="slow">
         <p:fade/>
       </p:transition>
@@ -21667,12 +22037,6 @@
 </file>
 
 <file path=customXml/item1.xml><?xml version="1.0" encoding="utf-8"?>
-<p:properties xmlns:p="http://schemas.microsoft.com/office/2006/metadata/properties" xmlns:xsi="http://www.w3.org/2001/XMLSchema-instance" xmlns:pc="http://schemas.microsoft.com/office/infopath/2007/PartnerControls">
-  <documentManagement/>
-</p:properties>
-</file>
-
-<file path=customXml/item2.xml><?xml version="1.0" encoding="utf-8"?>
 <ct:contentTypeSchema xmlns:ct="http://schemas.microsoft.com/office/2006/metadata/contentType" xmlns:ma="http://schemas.microsoft.com/office/2006/metadata/properties/metaAttributes" ct:_="" ma:_="" ma:contentTypeName="Document" ma:contentTypeID="0x010100FA4290E0C5772642A8FC1CC98664AB96" ma:contentTypeVersion="2" ma:contentTypeDescription="Create a new document." ma:contentTypeScope="" ma:versionID="32114bef771667d679b1d182fa59b753">
   <xsd:schema xmlns:xsd="http://www.w3.org/2001/XMLSchema" xmlns:xs="http://www.w3.org/2001/XMLSchema" xmlns:p="http://schemas.microsoft.com/office/2006/metadata/properties" xmlns:ns2="850c0f90-8dd5-496e-bada-6d6341eee147" targetNamespace="http://schemas.microsoft.com/office/2006/metadata/properties" ma:root="true" ma:fieldsID="0f14fa14523db8d62e7d73b45a62aa37" ns2:_="">
     <xsd:import namespace="850c0f90-8dd5-496e-bada-6d6341eee147"/>
@@ -21804,7 +22168,7 @@
 </ct:contentTypeSchema>
 </file>
 
-<file path=customXml/item3.xml><?xml version="1.0" encoding="utf-8"?>
+<file path=customXml/item2.xml><?xml version="1.0" encoding="utf-8"?>
 <?mso-contentType ?>
 <FormTemplates xmlns="http://schemas.microsoft.com/sharepoint/v3/contenttype/forms">
   <Display>DocumentLibraryForm</Display>
@@ -21813,23 +22177,13 @@
 </FormTemplates>
 </file>
 
-<file path=customXml/itemProps1.xml><?xml version="1.0" encoding="utf-8"?>
-<ds:datastoreItem xmlns:ds="http://schemas.openxmlformats.org/officeDocument/2006/customXml" ds:itemID="{AE85D584-F8D3-4B92-8858-7C712F8211DD}">
-  <ds:schemaRefs>
-    <ds:schemaRef ds:uri="http://schemas.openxmlformats.org/package/2006/metadata/core-properties"/>
-    <ds:schemaRef ds:uri="http://purl.org/dc/terms/"/>
-    <ds:schemaRef ds:uri="http://purl.org/dc/dcmitype/"/>
-    <ds:schemaRef ds:uri="http://purl.org/dc/elements/1.1/"/>
-    <ds:schemaRef ds:uri="850c0f90-8dd5-496e-bada-6d6341eee147"/>
-    <ds:schemaRef ds:uri="http://schemas.microsoft.com/office/2006/documentManagement/types"/>
-    <ds:schemaRef ds:uri="http://schemas.microsoft.com/office/infopath/2007/PartnerControls"/>
-    <ds:schemaRef ds:uri="http://schemas.microsoft.com/office/2006/metadata/properties"/>
-    <ds:schemaRef ds:uri="http://www.w3.org/XML/1998/namespace"/>
-  </ds:schemaRefs>
-</ds:datastoreItem>
+<file path=customXml/item3.xml><?xml version="1.0" encoding="utf-8"?>
+<p:properties xmlns:p="http://schemas.microsoft.com/office/2006/metadata/properties" xmlns:xsi="http://www.w3.org/2001/XMLSchema-instance" xmlns:pc="http://schemas.microsoft.com/office/infopath/2007/PartnerControls">
+  <documentManagement/>
+</p:properties>
 </file>
 
-<file path=customXml/itemProps2.xml><?xml version="1.0" encoding="utf-8"?>
+<file path=customXml/itemProps1.xml><?xml version="1.0" encoding="utf-8"?>
 <ds:datastoreItem xmlns:ds="http://schemas.openxmlformats.org/officeDocument/2006/customXml" ds:itemID="{F66F2204-5C76-4A2F-9022-0EC4A483E1AE}">
   <ds:schemaRefs>
     <ds:schemaRef ds:uri="http://schemas.microsoft.com/office/2006/metadata/contentType"/>
@@ -21847,10 +22201,26 @@
 </ds:datastoreItem>
 </file>
 
-<file path=customXml/itemProps3.xml><?xml version="1.0" encoding="utf-8"?>
+<file path=customXml/itemProps2.xml><?xml version="1.0" encoding="utf-8"?>
 <ds:datastoreItem xmlns:ds="http://schemas.openxmlformats.org/officeDocument/2006/customXml" ds:itemID="{24406AAB-63AE-44AC-958E-35782EDF4F81}">
   <ds:schemaRefs>
     <ds:schemaRef ds:uri="http://schemas.microsoft.com/sharepoint/v3/contenttype/forms"/>
   </ds:schemaRefs>
 </ds:datastoreItem>
+</file>
+
+<file path=customXml/itemProps3.xml><?xml version="1.0" encoding="utf-8"?>
+<ds:datastoreItem xmlns:ds="http://schemas.openxmlformats.org/officeDocument/2006/customXml" ds:itemID="{AE85D584-F8D3-4B92-8858-7C712F8211DD}">
+  <ds:schemaRefs>
+    <ds:schemaRef ds:uri="http://purl.org/dc/terms/"/>
+    <ds:schemaRef ds:uri="http://schemas.microsoft.com/office/2006/metadata/properties"/>
+    <ds:schemaRef ds:uri="http://purl.org/dc/dcmitype/"/>
+    <ds:schemaRef ds:uri="850c0f90-8dd5-496e-bada-6d6341eee147"/>
+    <ds:schemaRef ds:uri="http://schemas.microsoft.com/office/infopath/2007/PartnerControls"/>
+    <ds:schemaRef ds:uri="http://schemas.microsoft.com/office/2006/documentManagement/types"/>
+    <ds:schemaRef ds:uri="http://www.w3.org/XML/1998/namespace"/>
+    <ds:schemaRef ds:uri="http://schemas.openxmlformats.org/package/2006/metadata/core-properties"/>
+    <ds:schemaRef ds:uri="http://purl.org/dc/elements/1.1/"/>
+  </ds:schemaRefs>
+</ds:datastoreItem>
 </file>
</xml_diff>